<commit_message>
TW edits after Partner review
</commit_message>
<xml_diff>
--- a/docs/deployment_guide/images/guardium-insights-architecture-diagram.pptx
+++ b/docs/deployment_guide/images/guardium-insights-architecture-diagram.pptx
@@ -6544,7 +6544,7 @@
                 <a:ea typeface="Amazon Ember" panose="020B0603020204020204" pitchFamily="34" charset="0"/>
                 <a:cs typeface="Amazon Ember" panose="020B0603020204020204" pitchFamily="34" charset="0"/>
               </a:rPr>
-              <a:t>An Amazon Elastic Compute Cloud (Amazon EC2) instance for a boot node and bastion host to allow outbound internet access for resources in the private subnet.</a:t>
+              <a:t>An Amazon Elastic Compute Cloud (Amazon EC2) instance for a boot node and bastion host to allow inbound internet access to resources in the private subnet.</a:t>
             </a:r>
           </a:p>
           <a:p>
@@ -6974,7 +6974,7 @@
         </p:nvSpPr>
         <p:spPr>
           <a:xfrm>
-            <a:off x="917118" y="11951183"/>
+            <a:off x="917118" y="12674021"/>
             <a:ext cx="9783973" cy="1169551"/>
           </a:xfrm>
           <a:prstGeom prst="rect">

</xml_diff>